<commit_message>
Proposed name change based on meeting
</commit_message>
<xml_diff>
--- a/Usecases/ThreatRiskCapabilities.pptx
+++ b/Usecases/ThreatRiskCapabilities.pptx
@@ -5699,7 +5699,19 @@
           <a:p>
             <a:r>
               <a:rPr lang="en-US" dirty="0"/>
-              <a:t>Threat and Risk Information Sharing and Federation</a:t>
+              <a:t>Conceptual Model for Federated Operational </a:t>
+            </a:r>
+            <a:r>
+              <a:rPr lang="en-US" dirty="0">
+                <a:solidFill>
+                  <a:schemeClr val="tx1"/>
+                </a:solidFill>
+              </a:rPr>
+              <a:t>Threat and </a:t>
+            </a:r>
+            <a:r>
+              <a:rPr lang="en-US" dirty="0"/>
+              <a:t>Risk Information Sharing</a:t>
             </a:r>
           </a:p>
         </p:txBody>

</xml_diff>